<commit_message>
[feature] update building logic
</commit_message>
<xml_diff>
--- a/reports/super.pptx
+++ b/reports/super.pptx
@@ -219,7 +219,7 @@
           <a:p>
             <a:fld id="{221F47F8-8F26-4303-B72B-2DE34C3C26FE}" type="datetimeFigureOut">
               <a:rPr lang="ru-RU" smtClean="0"/>
-              <a:t>05.06.2018</a:t>
+              <a:t>08.06.2018</a:t>
             </a:fld>
             <a:endParaRPr lang="ru-RU"/>
           </a:p>
@@ -702,7 +702,7 @@
           <a:p>
             <a:fld id="{FDC26BFD-C536-4E19-99B4-5891DE8B8D7E}" type="datetimeFigureOut">
               <a:rPr lang="ru-RU" smtClean="0"/>
-              <a:t>05.06.2018</a:t>
+              <a:t>08.06.2018</a:t>
             </a:fld>
             <a:endParaRPr lang="ru-RU"/>
           </a:p>
@@ -872,7 +872,7 @@
           <a:p>
             <a:fld id="{FDC26BFD-C536-4E19-99B4-5891DE8B8D7E}" type="datetimeFigureOut">
               <a:rPr lang="ru-RU" smtClean="0"/>
-              <a:t>05.06.2018</a:t>
+              <a:t>08.06.2018</a:t>
             </a:fld>
             <a:endParaRPr lang="ru-RU"/>
           </a:p>
@@ -1052,7 +1052,7 @@
           <a:p>
             <a:fld id="{FDC26BFD-C536-4E19-99B4-5891DE8B8D7E}" type="datetimeFigureOut">
               <a:rPr lang="ru-RU" smtClean="0"/>
-              <a:t>05.06.2018</a:t>
+              <a:t>08.06.2018</a:t>
             </a:fld>
             <a:endParaRPr lang="ru-RU"/>
           </a:p>
@@ -1222,7 +1222,7 @@
           <a:p>
             <a:fld id="{FDC26BFD-C536-4E19-99B4-5891DE8B8D7E}" type="datetimeFigureOut">
               <a:rPr lang="ru-RU" smtClean="0"/>
-              <a:t>05.06.2018</a:t>
+              <a:t>08.06.2018</a:t>
             </a:fld>
             <a:endParaRPr lang="ru-RU"/>
           </a:p>
@@ -1468,7 +1468,7 @@
           <a:p>
             <a:fld id="{FDC26BFD-C536-4E19-99B4-5891DE8B8D7E}" type="datetimeFigureOut">
               <a:rPr lang="ru-RU" smtClean="0"/>
-              <a:t>05.06.2018</a:t>
+              <a:t>08.06.2018</a:t>
             </a:fld>
             <a:endParaRPr lang="ru-RU"/>
           </a:p>
@@ -1700,7 +1700,7 @@
           <a:p>
             <a:fld id="{FDC26BFD-C536-4E19-99B4-5891DE8B8D7E}" type="datetimeFigureOut">
               <a:rPr lang="ru-RU" smtClean="0"/>
-              <a:t>05.06.2018</a:t>
+              <a:t>08.06.2018</a:t>
             </a:fld>
             <a:endParaRPr lang="ru-RU"/>
           </a:p>
@@ -2067,7 +2067,7 @@
           <a:p>
             <a:fld id="{FDC26BFD-C536-4E19-99B4-5891DE8B8D7E}" type="datetimeFigureOut">
               <a:rPr lang="ru-RU" smtClean="0"/>
-              <a:t>05.06.2018</a:t>
+              <a:t>08.06.2018</a:t>
             </a:fld>
             <a:endParaRPr lang="ru-RU"/>
           </a:p>
@@ -2185,7 +2185,7 @@
           <a:p>
             <a:fld id="{FDC26BFD-C536-4E19-99B4-5891DE8B8D7E}" type="datetimeFigureOut">
               <a:rPr lang="ru-RU" smtClean="0"/>
-              <a:t>05.06.2018</a:t>
+              <a:t>08.06.2018</a:t>
             </a:fld>
             <a:endParaRPr lang="ru-RU"/>
           </a:p>
@@ -2280,7 +2280,7 @@
           <a:p>
             <a:fld id="{FDC26BFD-C536-4E19-99B4-5891DE8B8D7E}" type="datetimeFigureOut">
               <a:rPr lang="ru-RU" smtClean="0"/>
-              <a:t>05.06.2018</a:t>
+              <a:t>08.06.2018</a:t>
             </a:fld>
             <a:endParaRPr lang="ru-RU"/>
           </a:p>
@@ -2557,7 +2557,7 @@
           <a:p>
             <a:fld id="{FDC26BFD-C536-4E19-99B4-5891DE8B8D7E}" type="datetimeFigureOut">
               <a:rPr lang="ru-RU" smtClean="0"/>
-              <a:t>05.06.2018</a:t>
+              <a:t>08.06.2018</a:t>
             </a:fld>
             <a:endParaRPr lang="ru-RU"/>
           </a:p>
@@ -2810,7 +2810,7 @@
           <a:p>
             <a:fld id="{FDC26BFD-C536-4E19-99B4-5891DE8B8D7E}" type="datetimeFigureOut">
               <a:rPr lang="ru-RU" smtClean="0"/>
-              <a:t>05.06.2018</a:t>
+              <a:t>08.06.2018</a:t>
             </a:fld>
             <a:endParaRPr lang="ru-RU"/>
           </a:p>
@@ -3023,7 +3023,7 @@
           <a:p>
             <a:fld id="{FDC26BFD-C536-4E19-99B4-5891DE8B8D7E}" type="datetimeFigureOut">
               <a:rPr lang="ru-RU" smtClean="0"/>
-              <a:t>05.06.2018</a:t>
+              <a:t>08.06.2018</a:t>
             </a:fld>
             <a:endParaRPr lang="ru-RU"/>
           </a:p>
@@ -3739,13 +3739,7 @@
               <a:rPr lang="en-US" sz="4000" u="sng" dirty="0" smtClean="0">
                 <a:latin typeface="Albertus Bold" pitchFamily="50" charset="-52"/>
               </a:rPr>
-              <a:t>|</a:t>
-            </a:r>
-            <a:r>
-              <a:rPr lang="en-US" sz="4000" u="sng" dirty="0" smtClean="0">
-                <a:latin typeface="Albertus Bold" pitchFamily="50" charset="-52"/>
-              </a:rPr>
-              <a:t>1</a:t>
+              <a:t>|1</a:t>
             </a:r>
             <a:r>
               <a:rPr lang="ru-RU" sz="4000" u="sng" dirty="0" smtClean="0">
@@ -4110,13 +4104,7 @@
               <a:rPr lang="en-US" sz="4000" u="sng" dirty="0" smtClean="0">
                 <a:latin typeface="Albertus Bold" pitchFamily="50" charset="-52"/>
               </a:rPr>
-              <a:t>|</a:t>
-            </a:r>
-            <a:r>
-              <a:rPr lang="en-US" sz="4000" u="sng" dirty="0" smtClean="0">
-                <a:latin typeface="Albertus Bold" pitchFamily="50" charset="-52"/>
-              </a:rPr>
-              <a:t>1</a:t>
+              <a:t>|1</a:t>
             </a:r>
             <a:r>
               <a:rPr lang="ru-RU" sz="4000" u="sng" dirty="0" smtClean="0">
@@ -4217,13 +4205,7 @@
               <a:rPr lang="en-US" sz="4000" u="sng" dirty="0" smtClean="0">
                 <a:latin typeface="Albertus Bold" pitchFamily="50" charset="-52"/>
               </a:rPr>
-              <a:t>|</a:t>
-            </a:r>
-            <a:r>
-              <a:rPr lang="en-US" sz="4000" u="sng" dirty="0" smtClean="0">
-                <a:latin typeface="Albertus Bold" pitchFamily="50" charset="-52"/>
-              </a:rPr>
-              <a:t>1</a:t>
+              <a:t>|1</a:t>
             </a:r>
             <a:r>
               <a:rPr lang="ru-RU" sz="4000" u="sng" dirty="0" smtClean="0">
@@ -4331,13 +4313,7 @@
               <a:rPr lang="en-US" sz="4000" u="sng" dirty="0" smtClean="0">
                 <a:latin typeface="Albertus Bold" pitchFamily="50" charset="-52"/>
               </a:rPr>
-              <a:t>  |</a:t>
-            </a:r>
-            <a:r>
-              <a:rPr lang="en-US" sz="4000" u="sng" dirty="0" smtClean="0">
-                <a:latin typeface="Albertus Bold" pitchFamily="50" charset="-52"/>
-              </a:rPr>
-              <a:t>1</a:t>
+              <a:t>  |1</a:t>
             </a:r>
             <a:r>
               <a:rPr lang="ru-RU" sz="4000" u="sng" dirty="0" smtClean="0">
@@ -4671,13 +4647,7 @@
               <a:rPr lang="en-US" sz="4000" u="sng" dirty="0" smtClean="0">
                 <a:latin typeface="Albertus Bold" pitchFamily="50" charset="-52"/>
               </a:rPr>
-              <a:t>  |</a:t>
-            </a:r>
-            <a:r>
-              <a:rPr lang="en-US" sz="4000" u="sng" dirty="0" smtClean="0">
-                <a:latin typeface="Albertus Bold" pitchFamily="50" charset="-52"/>
-              </a:rPr>
-              <a:t>1</a:t>
+              <a:t>  |1</a:t>
             </a:r>
             <a:r>
               <a:rPr lang="ru-RU" sz="4000" u="sng" dirty="0" smtClean="0">
@@ -9866,13 +9836,7 @@
               <a:rPr lang="en-US" sz="4000" u="sng" dirty="0" smtClean="0">
                 <a:latin typeface="Albertus Bold" pitchFamily="50" charset="-52"/>
               </a:rPr>
-              <a:t>                                      </a:t>
-            </a:r>
-            <a:r>
-              <a:rPr lang="en-US" sz="4000" u="sng" dirty="0" smtClean="0">
-                <a:latin typeface="Albertus Bold" pitchFamily="50" charset="-52"/>
-              </a:rPr>
-              <a:t>|</a:t>
+              <a:t>                                      |</a:t>
             </a:r>
             <a:r>
               <a:rPr lang="ru-RU" sz="4000" u="sng" dirty="0" smtClean="0">
@@ -9923,8 +9887,8 @@
           <a:chExt cx="0" cy="0"/>
         </a:xfrm>
       </p:grpSpPr>
-      <mc:AlternateContent xmlns:mc="http://schemas.openxmlformats.org/markup-compatibility/2006" xmlns:a14="http://schemas.microsoft.com/office/drawing/2010/main">
-        <mc:Choice Requires="a14">
+      <mc:AlternateContent xmlns:mc="http://schemas.openxmlformats.org/markup-compatibility/2006">
+        <mc:Choice xmlns:a14="http://schemas.microsoft.com/office/drawing/2010/main" Requires="a14">
           <p:sp>
             <p:nvSpPr>
               <p:cNvPr id="3" name="Объект 2"/>
@@ -10107,7 +10071,13 @@
                       <a:rPr lang="en-US" b="1" i="1" smtClean="0">
                         <a:latin typeface="Cambria Math" panose="02040503050406030204" pitchFamily="18" charset="0"/>
                       </a:rPr>
-                      <m:t>𝑭𝑰𝑹𝑺𝑻</m:t>
+                      <m:t>𝑭</m:t>
+                    </m:r>
+                    <m:r>
+                      <a:rPr lang="en-US" b="1" i="1" smtClean="0">
+                        <a:latin typeface="Cambria Math" panose="02040503050406030204" pitchFamily="18" charset="0"/>
+                      </a:rPr>
+                      <m:t>𝑶𝑳𝑳𝑶𝑾</m:t>
                     </m:r>
                     <m:r>
                       <a:rPr lang="en-US" b="1" i="1" smtClean="0">
@@ -10186,7 +10156,7 @@
             </p:txBody>
           </p:sp>
         </mc:Choice>
-        <mc:Fallback xmlns="">
+        <mc:Fallback>
           <p:sp>
             <p:nvSpPr>
               <p:cNvPr id="3" name="Объект 2"/>
@@ -10256,13 +10226,7 @@
               <a:rPr lang="en-US" sz="4000" u="sng" dirty="0" smtClean="0">
                 <a:latin typeface="Albertus Bold" pitchFamily="50" charset="-52"/>
               </a:rPr>
-              <a:t>                                      </a:t>
-            </a:r>
-            <a:r>
-              <a:rPr lang="en-US" sz="4000" u="sng" dirty="0" smtClean="0">
-                <a:latin typeface="Albertus Bold" pitchFamily="50" charset="-52"/>
-              </a:rPr>
-              <a:t>|</a:t>
+              <a:t>                                      |</a:t>
             </a:r>
             <a:r>
               <a:rPr lang="ru-RU" sz="4000" u="sng" dirty="0" smtClean="0">
@@ -10352,13 +10316,7 @@
               <a:rPr lang="en-US" sz="4000" b="1" u="sng" dirty="0" smtClean="0">
                 <a:latin typeface="Albertus Bold" pitchFamily="50" charset="-52"/>
               </a:rPr>
-              <a:t>                               </a:t>
-            </a:r>
-            <a:r>
-              <a:rPr lang="en-US" sz="4000" b="1" u="sng" dirty="0" smtClean="0">
-                <a:latin typeface="Albertus Bold" pitchFamily="50" charset="-52"/>
-              </a:rPr>
-              <a:t>|</a:t>
+              <a:t>                               |</a:t>
             </a:r>
             <a:r>
               <a:rPr lang="ru-RU" sz="4000" b="1" u="sng" dirty="0" smtClean="0">
@@ -10930,13 +10888,7 @@
               <a:rPr lang="en-US" sz="4000" b="1" u="sng" dirty="0" smtClean="0">
                 <a:latin typeface="Albertus Bold" pitchFamily="50" charset="-52"/>
               </a:rPr>
-              <a:t>                               </a:t>
-            </a:r>
-            <a:r>
-              <a:rPr lang="en-US" sz="4000" b="1" u="sng" dirty="0" smtClean="0">
-                <a:latin typeface="Albertus Bold" pitchFamily="50" charset="-52"/>
-              </a:rPr>
-              <a:t>|</a:t>
+              <a:t>                               |</a:t>
             </a:r>
             <a:r>
               <a:rPr lang="ru-RU" sz="4000" b="1" u="sng" dirty="0" smtClean="0">
@@ -11233,13 +11185,7 @@
               <a:rPr lang="en-US" sz="4000" b="1" u="sng" dirty="0" smtClean="0">
                 <a:latin typeface="Albertus Bold" pitchFamily="50" charset="-52"/>
               </a:rPr>
-              <a:t>                               </a:t>
-            </a:r>
-            <a:r>
-              <a:rPr lang="en-US" sz="4000" b="1" u="sng" dirty="0" smtClean="0">
-                <a:latin typeface="Albertus Bold" pitchFamily="50" charset="-52"/>
-              </a:rPr>
-              <a:t>|</a:t>
+              <a:t>                               |</a:t>
             </a:r>
             <a:r>
               <a:rPr lang="ru-RU" sz="4000" b="1" u="sng" dirty="0" smtClean="0">
@@ -11390,13 +11336,7 @@
               <a:rPr lang="en-US" sz="4000" u="sng" dirty="0" smtClean="0">
                 <a:latin typeface="Albertus Bold" pitchFamily="50" charset="-52"/>
               </a:rPr>
-              <a:t>          </a:t>
-            </a:r>
-            <a:r>
-              <a:rPr lang="en-US" sz="4000" u="sng" dirty="0" smtClean="0">
-                <a:latin typeface="Albertus Bold" pitchFamily="50" charset="-52"/>
-              </a:rPr>
-              <a:t>|</a:t>
+              <a:t>          |</a:t>
             </a:r>
             <a:r>
               <a:rPr lang="ru-RU" sz="4000" u="sng" dirty="0" smtClean="0">

</xml_diff>

<commit_message>
[feature] add first positive tests builder implementation
</commit_message>
<xml_diff>
--- a/reports/super.pptx
+++ b/reports/super.pptx
@@ -219,7 +219,7 @@
           <a:p>
             <a:fld id="{221F47F8-8F26-4303-B72B-2DE34C3C26FE}" type="datetimeFigureOut">
               <a:rPr lang="ru-RU" smtClean="0"/>
-              <a:t>08.06.2018</a:t>
+              <a:t>13.06.2018</a:t>
             </a:fld>
             <a:endParaRPr lang="ru-RU"/>
           </a:p>
@@ -702,7 +702,7 @@
           <a:p>
             <a:fld id="{FDC26BFD-C536-4E19-99B4-5891DE8B8D7E}" type="datetimeFigureOut">
               <a:rPr lang="ru-RU" smtClean="0"/>
-              <a:t>08.06.2018</a:t>
+              <a:t>13.06.2018</a:t>
             </a:fld>
             <a:endParaRPr lang="ru-RU"/>
           </a:p>
@@ -872,7 +872,7 @@
           <a:p>
             <a:fld id="{FDC26BFD-C536-4E19-99B4-5891DE8B8D7E}" type="datetimeFigureOut">
               <a:rPr lang="ru-RU" smtClean="0"/>
-              <a:t>08.06.2018</a:t>
+              <a:t>13.06.2018</a:t>
             </a:fld>
             <a:endParaRPr lang="ru-RU"/>
           </a:p>
@@ -1052,7 +1052,7 @@
           <a:p>
             <a:fld id="{FDC26BFD-C536-4E19-99B4-5891DE8B8D7E}" type="datetimeFigureOut">
               <a:rPr lang="ru-RU" smtClean="0"/>
-              <a:t>08.06.2018</a:t>
+              <a:t>13.06.2018</a:t>
             </a:fld>
             <a:endParaRPr lang="ru-RU"/>
           </a:p>
@@ -1222,7 +1222,7 @@
           <a:p>
             <a:fld id="{FDC26BFD-C536-4E19-99B4-5891DE8B8D7E}" type="datetimeFigureOut">
               <a:rPr lang="ru-RU" smtClean="0"/>
-              <a:t>08.06.2018</a:t>
+              <a:t>13.06.2018</a:t>
             </a:fld>
             <a:endParaRPr lang="ru-RU"/>
           </a:p>
@@ -1468,7 +1468,7 @@
           <a:p>
             <a:fld id="{FDC26BFD-C536-4E19-99B4-5891DE8B8D7E}" type="datetimeFigureOut">
               <a:rPr lang="ru-RU" smtClean="0"/>
-              <a:t>08.06.2018</a:t>
+              <a:t>13.06.2018</a:t>
             </a:fld>
             <a:endParaRPr lang="ru-RU"/>
           </a:p>
@@ -1700,7 +1700,7 @@
           <a:p>
             <a:fld id="{FDC26BFD-C536-4E19-99B4-5891DE8B8D7E}" type="datetimeFigureOut">
               <a:rPr lang="ru-RU" smtClean="0"/>
-              <a:t>08.06.2018</a:t>
+              <a:t>13.06.2018</a:t>
             </a:fld>
             <a:endParaRPr lang="ru-RU"/>
           </a:p>
@@ -2067,7 +2067,7 @@
           <a:p>
             <a:fld id="{FDC26BFD-C536-4E19-99B4-5891DE8B8D7E}" type="datetimeFigureOut">
               <a:rPr lang="ru-RU" smtClean="0"/>
-              <a:t>08.06.2018</a:t>
+              <a:t>13.06.2018</a:t>
             </a:fld>
             <a:endParaRPr lang="ru-RU"/>
           </a:p>
@@ -2185,7 +2185,7 @@
           <a:p>
             <a:fld id="{FDC26BFD-C536-4E19-99B4-5891DE8B8D7E}" type="datetimeFigureOut">
               <a:rPr lang="ru-RU" smtClean="0"/>
-              <a:t>08.06.2018</a:t>
+              <a:t>13.06.2018</a:t>
             </a:fld>
             <a:endParaRPr lang="ru-RU"/>
           </a:p>
@@ -2280,7 +2280,7 @@
           <a:p>
             <a:fld id="{FDC26BFD-C536-4E19-99B4-5891DE8B8D7E}" type="datetimeFigureOut">
               <a:rPr lang="ru-RU" smtClean="0"/>
-              <a:t>08.06.2018</a:t>
+              <a:t>13.06.2018</a:t>
             </a:fld>
             <a:endParaRPr lang="ru-RU"/>
           </a:p>
@@ -2557,7 +2557,7 @@
           <a:p>
             <a:fld id="{FDC26BFD-C536-4E19-99B4-5891DE8B8D7E}" type="datetimeFigureOut">
               <a:rPr lang="ru-RU" smtClean="0"/>
-              <a:t>08.06.2018</a:t>
+              <a:t>13.06.2018</a:t>
             </a:fld>
             <a:endParaRPr lang="ru-RU"/>
           </a:p>
@@ -2810,7 +2810,7 @@
           <a:p>
             <a:fld id="{FDC26BFD-C536-4E19-99B4-5891DE8B8D7E}" type="datetimeFigureOut">
               <a:rPr lang="ru-RU" smtClean="0"/>
-              <a:t>08.06.2018</a:t>
+              <a:t>13.06.2018</a:t>
             </a:fld>
             <a:endParaRPr lang="ru-RU"/>
           </a:p>
@@ -3023,7 +3023,7 @@
           <a:p>
             <a:fld id="{FDC26BFD-C536-4E19-99B4-5891DE8B8D7E}" type="datetimeFigureOut">
               <a:rPr lang="ru-RU" smtClean="0"/>
-              <a:t>08.06.2018</a:t>
+              <a:t>13.06.2018</a:t>
             </a:fld>
             <a:endParaRPr lang="ru-RU"/>
           </a:p>
@@ -3523,26 +3523,10 @@
                 </a:solidFill>
                 <a:latin typeface="PT Sans" panose="020B0503020203020204" pitchFamily="34" charset="-52"/>
               </a:rPr>
-              <a:t>МГТУ им. Н.Э. Баумана</a:t>
-            </a:r>
-          </a:p>
-          <a:p>
-            <a:endParaRPr lang="ru-RU" dirty="0" smtClean="0">
-              <a:solidFill>
-                <a:schemeClr val="bg2">
-                  <a:lumMod val="50000"/>
-                </a:schemeClr>
-              </a:solidFill>
-            </a:endParaRPr>
-          </a:p>
-          <a:p>
-            <a:pPr>
-              <a:lnSpc>
-                <a:spcPct val="60000"/>
-              </a:lnSpc>
-            </a:pPr>
-            <a:r>
-              <a:rPr lang="ru-RU" sz="1800" dirty="0" smtClean="0">
+              <a:t>МГТУ им. Н.Э. </a:t>
+            </a:r>
+            <a:r>
+              <a:rPr lang="ru-RU" sz="1400" dirty="0" smtClean="0">
                 <a:solidFill>
                   <a:schemeClr val="bg2">
                     <a:lumMod val="50000"/>
@@ -3550,103 +3534,9 @@
                 </a:solidFill>
                 <a:latin typeface="PT Sans" panose="020B0503020203020204" pitchFamily="34" charset="-52"/>
               </a:rPr>
-              <a:t>Совместное рабочее совещание</a:t>
-            </a:r>
-          </a:p>
-          <a:p>
-            <a:pPr>
-              <a:lnSpc>
-                <a:spcPct val="60000"/>
-              </a:lnSpc>
-            </a:pPr>
-            <a:r>
-              <a:rPr lang="ru-RU" sz="1800" dirty="0" smtClean="0">
-                <a:solidFill>
-                  <a:schemeClr val="bg2">
-                    <a:lumMod val="50000"/>
-                  </a:schemeClr>
-                </a:solidFill>
-                <a:latin typeface="PT Sans" panose="020B0503020203020204" pitchFamily="34" charset="-52"/>
-              </a:rPr>
-              <a:t>ИПС имени А. К. </a:t>
-            </a:r>
-            <a:r>
-              <a:rPr lang="ru-RU" sz="1800" dirty="0" err="1" smtClean="0">
-                <a:solidFill>
-                  <a:schemeClr val="bg2">
-                    <a:lumMod val="50000"/>
-                  </a:schemeClr>
-                </a:solidFill>
-                <a:latin typeface="PT Sans" panose="020B0503020203020204" pitchFamily="34" charset="-52"/>
-              </a:rPr>
-              <a:t>Айламазяна</a:t>
-            </a:r>
-            <a:r>
-              <a:rPr lang="ru-RU" sz="1800" dirty="0" smtClean="0">
-                <a:solidFill>
-                  <a:schemeClr val="bg2">
-                    <a:lumMod val="50000"/>
-                  </a:schemeClr>
-                </a:solidFill>
-                <a:latin typeface="PT Sans" panose="020B0503020203020204" pitchFamily="34" charset="-52"/>
-              </a:rPr>
-              <a:t> РАН</a:t>
-            </a:r>
-          </a:p>
-          <a:p>
-            <a:pPr>
-              <a:lnSpc>
-                <a:spcPct val="60000"/>
-              </a:lnSpc>
-            </a:pPr>
-            <a:r>
-              <a:rPr lang="ru-RU" sz="1800" dirty="0" smtClean="0">
-                <a:solidFill>
-                  <a:schemeClr val="bg2">
-                    <a:lumMod val="50000"/>
-                  </a:schemeClr>
-                </a:solidFill>
-                <a:latin typeface="PT Sans" panose="020B0503020203020204" pitchFamily="34" charset="-52"/>
-              </a:rPr>
-              <a:t>и</a:t>
-            </a:r>
-          </a:p>
-          <a:p>
-            <a:pPr>
-              <a:lnSpc>
-                <a:spcPct val="60000"/>
-              </a:lnSpc>
-            </a:pPr>
-            <a:r>
-              <a:rPr lang="ru-RU" sz="1800" dirty="0" smtClean="0">
-                <a:solidFill>
-                  <a:schemeClr val="bg2">
-                    <a:lumMod val="50000"/>
-                  </a:schemeClr>
-                </a:solidFill>
-                <a:latin typeface="PT Sans" panose="020B0503020203020204" pitchFamily="34" charset="-52"/>
-              </a:rPr>
-              <a:t>МГТУ имени Н. Э. Баумана</a:t>
-            </a:r>
-          </a:p>
-          <a:p>
-            <a:endParaRPr lang="ru-RU" sz="2000" dirty="0">
-              <a:latin typeface="PT Sans" panose="020B0503020203020204" pitchFamily="34" charset="-52"/>
-            </a:endParaRPr>
-          </a:p>
-          <a:p>
-            <a:r>
-              <a:rPr lang="ru-RU" sz="1600" dirty="0" smtClean="0">
-                <a:solidFill>
-                  <a:schemeClr val="bg2">
-                    <a:lumMod val="50000"/>
-                  </a:schemeClr>
-                </a:solidFill>
-                <a:latin typeface="PT Sans" panose="020B0503020203020204" pitchFamily="34" charset="-52"/>
-              </a:rPr>
-              <a:t>5 июня 2018 г.</a:t>
-            </a:r>
-            <a:endParaRPr lang="ru-RU" sz="1600" dirty="0">
+              <a:t>Баумана</a:t>
+            </a:r>
+            <a:endParaRPr lang="ru-RU" sz="1400" dirty="0" smtClean="0">
               <a:solidFill>
                 <a:schemeClr val="bg2">
                   <a:lumMod val="50000"/>
@@ -6257,30 +6147,6 @@
           </a:p>
         </p:txBody>
       </p:sp>
-      <p:pic>
-        <p:nvPicPr>
-          <p:cNvPr id="3" name="Рисунок 2"/>
-          <p:cNvPicPr>
-            <a:picLocks noChangeAspect="1"/>
-          </p:cNvPicPr>
-          <p:nvPr/>
-        </p:nvPicPr>
-        <p:blipFill>
-          <a:blip r:embed="rId2"/>
-          <a:stretch>
-            <a:fillRect/>
-          </a:stretch>
-        </p:blipFill>
-        <p:spPr>
-          <a:xfrm>
-            <a:off x="4354286" y="1329465"/>
-            <a:ext cx="6830378" cy="5528535"/>
-          </a:xfrm>
-          <a:prstGeom prst="rect">
-            <a:avLst/>
-          </a:prstGeom>
-        </p:spPr>
-      </p:pic>
       <mc:AlternateContent xmlns:mc="http://schemas.openxmlformats.org/markup-compatibility/2006" xmlns:a14="http://schemas.microsoft.com/office/drawing/2010/main">
         <mc:Choice Requires="a14">
           <p:sp>
@@ -6786,6 +6652,30 @@
           </p:sp>
         </mc:Fallback>
       </mc:AlternateContent>
+      <p:pic>
+        <p:nvPicPr>
+          <p:cNvPr id="5" name="Рисунок 4"/>
+          <p:cNvPicPr>
+            <a:picLocks noChangeAspect="1"/>
+          </p:cNvPicPr>
+          <p:nvPr/>
+        </p:nvPicPr>
+        <p:blipFill>
+          <a:blip r:embed="rId4"/>
+          <a:stretch>
+            <a:fillRect/>
+          </a:stretch>
+        </p:blipFill>
+        <p:spPr>
+          <a:xfrm>
+            <a:off x="4717150" y="2818038"/>
+            <a:ext cx="6591584" cy="2076179"/>
+          </a:xfrm>
+          <a:prstGeom prst="rect">
+            <a:avLst/>
+          </a:prstGeom>
+        </p:spPr>
+      </p:pic>
     </p:spTree>
     <p:extLst>
       <p:ext uri="{BB962C8B-B14F-4D97-AF65-F5344CB8AC3E}">
@@ -9887,8 +9777,8 @@
           <a:chExt cx="0" cy="0"/>
         </a:xfrm>
       </p:grpSpPr>
-      <mc:AlternateContent xmlns:mc="http://schemas.openxmlformats.org/markup-compatibility/2006">
-        <mc:Choice xmlns:a14="http://schemas.microsoft.com/office/drawing/2010/main" Requires="a14">
+      <mc:AlternateContent xmlns:mc="http://schemas.openxmlformats.org/markup-compatibility/2006" xmlns:a14="http://schemas.microsoft.com/office/drawing/2010/main">
+        <mc:Choice Requires="a14">
           <p:sp>
             <p:nvSpPr>
               <p:cNvPr id="3" name="Объект 2"/>
@@ -10071,13 +9961,7 @@
                       <a:rPr lang="en-US" b="1" i="1" smtClean="0">
                         <a:latin typeface="Cambria Math" panose="02040503050406030204" pitchFamily="18" charset="0"/>
                       </a:rPr>
-                      <m:t>𝑭</m:t>
-                    </m:r>
-                    <m:r>
-                      <a:rPr lang="en-US" b="1" i="1" smtClean="0">
-                        <a:latin typeface="Cambria Math" panose="02040503050406030204" pitchFamily="18" charset="0"/>
-                      </a:rPr>
-                      <m:t>𝑶𝑳𝑳𝑶𝑾</m:t>
+                      <m:t>𝑭𝑶𝑳𝑳𝑶𝑾</m:t>
                     </m:r>
                     <m:r>
                       <a:rPr lang="en-US" b="1" i="1" smtClean="0">
@@ -10156,7 +10040,7 @@
             </p:txBody>
           </p:sp>
         </mc:Choice>
-        <mc:Fallback>
+        <mc:Fallback xmlns="">
           <p:sp>
             <p:nvSpPr>
               <p:cNvPr id="3" name="Объект 2"/>

</xml_diff>